<commit_message>
ppt met opdrachten week 6 toegevoegd
</commit_message>
<xml_diff>
--- a/programma/WeekZesPowerpoint.pptx
+++ b/programma/WeekZesPowerpoint.pptx
@@ -5,7 +5,7 @@
     <p:sldMasterId id="2147483648" r:id="rId1"/>
   </p:sldMasterIdLst>
   <p:notesMasterIdLst>
-    <p:notesMasterId r:id="rId9"/>
+    <p:notesMasterId r:id="rId8"/>
   </p:notesMasterIdLst>
   <p:sldIdLst>
     <p:sldId id="256" r:id="rId2"/>
@@ -14,7 +14,6 @@
     <p:sldId id="260" r:id="rId5"/>
     <p:sldId id="261" r:id="rId6"/>
     <p:sldId id="262" r:id="rId7"/>
-    <p:sldId id="259" r:id="rId8"/>
   </p:sldIdLst>
   <p:sldSz cx="12192000" cy="6858000"/>
   <p:notesSz cx="6858000" cy="9144000"/>
@@ -113,6 +112,11 @@
       </a:defRPr>
     </a:lvl9pPr>
   </p:defaultTextStyle>
+  <p:extLst>
+    <p:ext uri="{EFAFB233-063F-42B5-8137-9DF3F51BA10A}">
+      <p15:sldGuideLst xmlns:p15="http://schemas.microsoft.com/office/powerpoint/2012/main"/>
+    </p:ext>
+  </p:extLst>
 </p:presentation>
 </file>
 
@@ -198,7 +202,7 @@
           <a:p>
             <a:fld id="{691D6EF0-B65E-4424-8067-87621C75D044}" type="datetimeFigureOut">
               <a:rPr lang="nl-NL" smtClean="0"/>
-              <a:t>14-3-2024</a:t>
+              <a:t>17-3-2024</a:t>
             </a:fld>
             <a:endParaRPr lang="nl-NL"/>
           </a:p>
@@ -706,7 +710,7 @@
           <a:p>
             <a:fld id="{86284D24-97BE-4698-B9D2-172D80373B5E}" type="datetimeFigureOut">
               <a:rPr lang="nl-NL" smtClean="0"/>
-              <a:t>14-3-2024</a:t>
+              <a:t>17-3-2024</a:t>
             </a:fld>
             <a:endParaRPr lang="nl-NL"/>
           </a:p>
@@ -904,7 +908,7 @@
           <a:p>
             <a:fld id="{86284D24-97BE-4698-B9D2-172D80373B5E}" type="datetimeFigureOut">
               <a:rPr lang="nl-NL" smtClean="0"/>
-              <a:t>14-3-2024</a:t>
+              <a:t>17-3-2024</a:t>
             </a:fld>
             <a:endParaRPr lang="nl-NL"/>
           </a:p>
@@ -1112,7 +1116,7 @@
           <a:p>
             <a:fld id="{86284D24-97BE-4698-B9D2-172D80373B5E}" type="datetimeFigureOut">
               <a:rPr lang="nl-NL" smtClean="0"/>
-              <a:t>14-3-2024</a:t>
+              <a:t>17-3-2024</a:t>
             </a:fld>
             <a:endParaRPr lang="nl-NL"/>
           </a:p>
@@ -1310,7 +1314,7 @@
           <a:p>
             <a:fld id="{86284D24-97BE-4698-B9D2-172D80373B5E}" type="datetimeFigureOut">
               <a:rPr lang="nl-NL" smtClean="0"/>
-              <a:t>14-3-2024</a:t>
+              <a:t>17-3-2024</a:t>
             </a:fld>
             <a:endParaRPr lang="nl-NL"/>
           </a:p>
@@ -1585,7 +1589,7 @@
           <a:p>
             <a:fld id="{86284D24-97BE-4698-B9D2-172D80373B5E}" type="datetimeFigureOut">
               <a:rPr lang="nl-NL" smtClean="0"/>
-              <a:t>14-3-2024</a:t>
+              <a:t>17-3-2024</a:t>
             </a:fld>
             <a:endParaRPr lang="nl-NL"/>
           </a:p>
@@ -1850,7 +1854,7 @@
           <a:p>
             <a:fld id="{86284D24-97BE-4698-B9D2-172D80373B5E}" type="datetimeFigureOut">
               <a:rPr lang="nl-NL" smtClean="0"/>
-              <a:t>14-3-2024</a:t>
+              <a:t>17-3-2024</a:t>
             </a:fld>
             <a:endParaRPr lang="nl-NL"/>
           </a:p>
@@ -2262,7 +2266,7 @@
           <a:p>
             <a:fld id="{86284D24-97BE-4698-B9D2-172D80373B5E}" type="datetimeFigureOut">
               <a:rPr lang="nl-NL" smtClean="0"/>
-              <a:t>14-3-2024</a:t>
+              <a:t>17-3-2024</a:t>
             </a:fld>
             <a:endParaRPr lang="nl-NL"/>
           </a:p>
@@ -2403,7 +2407,7 @@
           <a:p>
             <a:fld id="{86284D24-97BE-4698-B9D2-172D80373B5E}" type="datetimeFigureOut">
               <a:rPr lang="nl-NL" smtClean="0"/>
-              <a:t>14-3-2024</a:t>
+              <a:t>17-3-2024</a:t>
             </a:fld>
             <a:endParaRPr lang="nl-NL"/>
           </a:p>
@@ -2516,7 +2520,7 @@
           <a:p>
             <a:fld id="{86284D24-97BE-4698-B9D2-172D80373B5E}" type="datetimeFigureOut">
               <a:rPr lang="nl-NL" smtClean="0"/>
-              <a:t>14-3-2024</a:t>
+              <a:t>17-3-2024</a:t>
             </a:fld>
             <a:endParaRPr lang="nl-NL"/>
           </a:p>
@@ -2827,7 +2831,7 @@
           <a:p>
             <a:fld id="{86284D24-97BE-4698-B9D2-172D80373B5E}" type="datetimeFigureOut">
               <a:rPr lang="nl-NL" smtClean="0"/>
-              <a:t>14-3-2024</a:t>
+              <a:t>17-3-2024</a:t>
             </a:fld>
             <a:endParaRPr lang="nl-NL"/>
           </a:p>
@@ -3115,7 +3119,7 @@
           <a:p>
             <a:fld id="{86284D24-97BE-4698-B9D2-172D80373B5E}" type="datetimeFigureOut">
               <a:rPr lang="nl-NL" smtClean="0"/>
-              <a:t>14-3-2024</a:t>
+              <a:t>17-3-2024</a:t>
             </a:fld>
             <a:endParaRPr lang="nl-NL"/>
           </a:p>
@@ -3356,7 +3360,7 @@
           <a:p>
             <a:fld id="{86284D24-97BE-4698-B9D2-172D80373B5E}" type="datetimeFigureOut">
               <a:rPr lang="nl-NL" smtClean="0"/>
-              <a:t>14-3-2024</a:t>
+              <a:t>17-3-2024</a:t>
             </a:fld>
             <a:endParaRPr lang="nl-NL"/>
           </a:p>
@@ -4200,8 +4204,20 @@
               <a:buNone/>
             </a:pPr>
             <a:r>
-              <a:rPr lang="nl-NL"/>
-              <a:t>graden Kelvin omzet naar graden Celsius.</a:t>
+              <a:rPr lang="nl-NL" b="1"/>
+              <a:t>Kelvin</a:t>
+            </a:r>
+            <a:r>
+              <a:rPr lang="nl-NL"/>
+              <a:t> omzet naar graden </a:t>
+            </a:r>
+            <a:r>
+              <a:rPr lang="nl-NL" b="1"/>
+              <a:t>Celsius</a:t>
+            </a:r>
+            <a:r>
+              <a:rPr lang="nl-NL"/>
+              <a:t>.</a:t>
             </a:r>
           </a:p>
           <a:p>
@@ -4225,7 +4241,23 @@
             </a:pPr>
             <a:r>
               <a:rPr lang="nl-NL"/>
-              <a:t>graden Celsius omzet naar graden Kelvin.</a:t>
+              <a:t>graden </a:t>
+            </a:r>
+            <a:r>
+              <a:rPr lang="nl-NL" b="1"/>
+              <a:t>Celsius</a:t>
+            </a:r>
+            <a:r>
+              <a:rPr lang="nl-NL"/>
+              <a:t> omzet naar </a:t>
+            </a:r>
+            <a:r>
+              <a:rPr lang="nl-NL" b="1"/>
+              <a:t>Kelvin</a:t>
+            </a:r>
+            <a:r>
+              <a:rPr lang="nl-NL"/>
+              <a:t>.</a:t>
             </a:r>
           </a:p>
           <a:p>
@@ -4667,103 +4699,6 @@
   </p:cSld>
   <p:clrMapOvr>
     <a:masterClrMapping/>
-  </p:clrMapOvr>
-</p:sld>
-</file>
-
-<file path=ppt/slides/slide7.xml><?xml version="1.0" encoding="utf-8"?>
-<p:sld xmlns:a="http://schemas.openxmlformats.org/drawingml/2006/main" xmlns:r="http://schemas.openxmlformats.org/officeDocument/2006/relationships" xmlns:p="http://schemas.openxmlformats.org/presentationml/2006/main">
-  <p:cSld>
-    <p:bg>
-      <p:bgRef idx="1001">
-        <a:schemeClr val="bg1"/>
-      </p:bgRef>
-    </p:bg>
-    <p:spTree>
-      <p:nvGrpSpPr>
-        <p:cNvPr id="1" name=""/>
-        <p:cNvGrpSpPr/>
-        <p:nvPr/>
-      </p:nvGrpSpPr>
-      <p:grpSpPr>
-        <a:xfrm>
-          <a:off x="0" y="0"/>
-          <a:ext cx="0" cy="0"/>
-          <a:chOff x="0" y="0"/>
-          <a:chExt cx="0" cy="0"/>
-        </a:xfrm>
-      </p:grpSpPr>
-      <p:sp>
-        <p:nvSpPr>
-          <p:cNvPr id="2" name="Titel 1">
-            <a:extLst>
-              <a:ext uri="{FF2B5EF4-FFF2-40B4-BE49-F238E27FC236}">
-                <a16:creationId xmlns:a16="http://schemas.microsoft.com/office/drawing/2014/main" id="{BBB26C7E-A69D-7372-291A-79D35B62CC92}"/>
-              </a:ext>
-            </a:extLst>
-          </p:cNvPr>
-          <p:cNvSpPr>
-            <a:spLocks noGrp="1"/>
-          </p:cNvSpPr>
-          <p:nvPr>
-            <p:ph type="title"/>
-          </p:nvPr>
-        </p:nvSpPr>
-        <p:spPr/>
-        <p:txBody>
-          <a:bodyPr/>
-          <a:lstStyle/>
-          <a:p>
-            <a:r>
-              <a:rPr lang="nl-NL"/>
-              <a:t>References &amp; Const</a:t>
-            </a:r>
-          </a:p>
-        </p:txBody>
-      </p:sp>
-      <p:sp>
-        <p:nvSpPr>
-          <p:cNvPr id="3" name="Tijdelijke aanduiding voor inhoud 2">
-            <a:extLst>
-              <a:ext uri="{FF2B5EF4-FFF2-40B4-BE49-F238E27FC236}">
-                <a16:creationId xmlns:a16="http://schemas.microsoft.com/office/drawing/2014/main" id="{631F2DDB-5C31-864F-3541-1A96B535F34F}"/>
-              </a:ext>
-            </a:extLst>
-          </p:cNvPr>
-          <p:cNvSpPr>
-            <a:spLocks noGrp="1"/>
-          </p:cNvSpPr>
-          <p:nvPr>
-            <p:ph idx="1"/>
-          </p:nvPr>
-        </p:nvSpPr>
-        <p:spPr/>
-        <p:txBody>
-          <a:bodyPr/>
-          <a:lstStyle/>
-          <a:p>
-            <a:pPr marL="0" indent="0">
-              <a:buNone/>
-            </a:pPr>
-            <a:endParaRPr lang="nl-NL"/>
-          </a:p>
-          <a:p>
-            <a:pPr marL="0" indent="0">
-              <a:buNone/>
-            </a:pPr>
-            <a:endParaRPr lang="nl-NL"/>
-          </a:p>
-        </p:txBody>
-      </p:sp>
-    </p:spTree>
-    <p:extLst>
-      <p:ext uri="{BB962C8B-B14F-4D97-AF65-F5344CB8AC3E}">
-        <p14:creationId xmlns:p14="http://schemas.microsoft.com/office/powerpoint/2010/main" val="3082630450"/>
-      </p:ext>
-    </p:extLst>
-  </p:cSld>
-  <p:clrMapOvr>
-    <a:overrideClrMapping bg1="lt1" tx1="dk1" bg2="lt2" tx2="dk2" accent1="accent1" accent2="accent2" accent3="accent3" accent4="accent4" accent5="accent5" accent6="accent6" hlink="hlink" folHlink="folHlink"/>
   </p:clrMapOvr>
 </p:sld>
 </file>
@@ -5396,47 +5331,4 @@
     </a:ext>
   </a:extLst>
 </a:theme>
-</file>
-
-<file path=ppt/theme/themeOverride1.xml><?xml version="1.0" encoding="utf-8"?>
-<a:themeOverride xmlns:a="http://schemas.openxmlformats.org/drawingml/2006/main">
-  <a:clrScheme name="Office">
-    <a:dk1>
-      <a:sysClr val="windowText" lastClr="000000"/>
-    </a:dk1>
-    <a:lt1>
-      <a:sysClr val="window" lastClr="FFFFFF"/>
-    </a:lt1>
-    <a:dk2>
-      <a:srgbClr val="0E2841"/>
-    </a:dk2>
-    <a:lt2>
-      <a:srgbClr val="E8E8E8"/>
-    </a:lt2>
-    <a:accent1>
-      <a:srgbClr val="156082"/>
-    </a:accent1>
-    <a:accent2>
-      <a:srgbClr val="E97132"/>
-    </a:accent2>
-    <a:accent3>
-      <a:srgbClr val="196B24"/>
-    </a:accent3>
-    <a:accent4>
-      <a:srgbClr val="0F9ED5"/>
-    </a:accent4>
-    <a:accent5>
-      <a:srgbClr val="A02B93"/>
-    </a:accent5>
-    <a:accent6>
-      <a:srgbClr val="4EA72E"/>
-    </a:accent6>
-    <a:hlink>
-      <a:srgbClr val="467886"/>
-    </a:hlink>
-    <a:folHlink>
-      <a:srgbClr val="96607D"/>
-    </a:folHlink>
-  </a:clrScheme>
-</a:themeOverride>
 </file>
</xml_diff>